<commit_message>
Updating course handout PPT file
Update a word of course handout PPT file.

Signed-off-by: manjucc <106427133@qq.com>
</commit_message>
<xml_diff>
--- a/lfs-7.7-systemd/documents/LFS-on-openEuler_Course-Handout_v1.3.pptx
+++ b/lfs-7.7-systemd/documents/LFS-on-openEuler_Course-Handout_v1.3.pptx
@@ -28781,7 +28781,15 @@
             </a:r>
             <a:r>
               <a:rPr lang="zh-CN" altLang="en-US" dirty="0"/>
-              <a:t>目标系统构建的过程，本实验没有给出修正方案，而是留给有兴趣的同学自己去解决。</a:t>
+              <a:t>目标系统</a:t>
+            </a:r>
+            <a:r>
+              <a:rPr lang="zh-CN" altLang="en-US"/>
+              <a:t>构建的流程，</a:t>
+            </a:r>
+            <a:r>
+              <a:rPr lang="zh-CN" altLang="en-US" dirty="0"/>
+              <a:t>本实验没有给出修正方案，而是留给有兴趣的同学自己去解决。</a:t>
             </a:r>
             <a:endParaRPr lang="en-US" altLang="zh-CN" dirty="0"/>
           </a:p>
@@ -32940,21 +32948,6 @@
 </file>
 
 <file path=customXml/item1.xml><?xml version="1.0" encoding="utf-8"?>
-<?mso-contentType ?>
-<FormTemplates xmlns="http://schemas.microsoft.com/sharepoint/v3/contenttype/forms">
-  <Display>DocumentLibraryForm</Display>
-  <Edit>DocumentLibraryForm</Edit>
-  <New>DocumentLibraryForm</New>
-</FormTemplates>
-</file>
-
-<file path=customXml/item2.xml><?xml version="1.0" encoding="utf-8"?>
-<p:properties xmlns:p="http://schemas.microsoft.com/office/2006/metadata/properties" xmlns:xsi="http://www.w3.org/2001/XMLSchema-instance" xmlns:pc="http://schemas.microsoft.com/office/infopath/2007/PartnerControls">
-  <documentManagement/>
-</p:properties>
-</file>
-
-<file path=customXml/item3.xml><?xml version="1.0" encoding="utf-8"?>
 <ct:contentTypeSchema xmlns:ct="http://schemas.microsoft.com/office/2006/metadata/contentType" xmlns:ma="http://schemas.microsoft.com/office/2006/metadata/properties/metaAttributes" ct:_="" ma:_="" ma:contentTypeName="Document" ma:contentTypeID="0x010100CC226774B8D87F4D92D9D1F6859ED44E" ma:contentTypeVersion="1" ma:contentTypeDescription="Create a new document." ma:contentTypeScope="" ma:versionID="192c310b45bae95d9fdbb51d5532622b">
   <xsd:schema xmlns:xsd="http://www.w3.org/2001/XMLSchema" xmlns:xs="http://www.w3.org/2001/XMLSchema" xmlns:p="http://schemas.microsoft.com/office/2006/metadata/properties" xmlns:ns2="475f1e55-3009-46d8-9566-5d569a2b3a98" targetNamespace="http://schemas.microsoft.com/office/2006/metadata/properties" ma:root="true" ma:fieldsID="1d095aabec1d15598815726bd4b054a7" ns2:_="">
     <xsd:import namespace="475f1e55-3009-46d8-9566-5d569a2b3a98"/>
@@ -33094,10 +33087,35 @@
 </ct:contentTypeSchema>
 </file>
 
+<file path=customXml/item2.xml><?xml version="1.0" encoding="utf-8"?>
+<p:properties xmlns:p="http://schemas.microsoft.com/office/2006/metadata/properties" xmlns:xsi="http://www.w3.org/2001/XMLSchema-instance" xmlns:pc="http://schemas.microsoft.com/office/infopath/2007/PartnerControls">
+  <documentManagement/>
+</p:properties>
+</file>
+
+<file path=customXml/item3.xml><?xml version="1.0" encoding="utf-8"?>
+<?mso-contentType ?>
+<FormTemplates xmlns="http://schemas.microsoft.com/sharepoint/v3/contenttype/forms">
+  <Display>DocumentLibraryForm</Display>
+  <Edit>DocumentLibraryForm</Edit>
+  <New>DocumentLibraryForm</New>
+</FormTemplates>
+</file>
+
 <file path=customXml/itemProps1.xml><?xml version="1.0" encoding="utf-8"?>
-<ds:datastoreItem xmlns:ds="http://schemas.openxmlformats.org/officeDocument/2006/customXml" ds:itemID="{FEDE263F-0510-4442-823E-69B63ECB61E1}">
+<ds:datastoreItem xmlns:ds="http://schemas.openxmlformats.org/officeDocument/2006/customXml" ds:itemID="{CC2FADE7-0FB7-4D32-803A-97A461853B0F}">
   <ds:schemaRefs>
-    <ds:schemaRef ds:uri="http://schemas.microsoft.com/sharepoint/v3/contenttype/forms"/>
+    <ds:schemaRef ds:uri="http://schemas.microsoft.com/office/2006/metadata/contentType"/>
+    <ds:schemaRef ds:uri="http://schemas.microsoft.com/office/2006/metadata/properties/metaAttributes"/>
+    <ds:schemaRef ds:uri="http://www.w3.org/2001/XMLSchema"/>
+    <ds:schemaRef ds:uri="http://schemas.microsoft.com/office/2006/metadata/properties"/>
+    <ds:schemaRef ds:uri="475f1e55-3009-46d8-9566-5d569a2b3a98"/>
+    <ds:schemaRef ds:uri="http://schemas.microsoft.com/office/2006/documentManagement/types"/>
+    <ds:schemaRef ds:uri="http://schemas.microsoft.com/office/infopath/2007/PartnerControls"/>
+    <ds:schemaRef ds:uri="http://schemas.openxmlformats.org/package/2006/metadata/core-properties"/>
+    <ds:schemaRef ds:uri="http://purl.org/dc/elements/1.1/"/>
+    <ds:schemaRef ds:uri="http://purl.org/dc/terms/"/>
+    <ds:schemaRef ds:uri="http://schemas.microsoft.com/internal/obd"/>
   </ds:schemaRefs>
 </ds:datastoreItem>
 </file>
@@ -33119,19 +33137,9 @@
 </file>
 
 <file path=customXml/itemProps3.xml><?xml version="1.0" encoding="utf-8"?>
-<ds:datastoreItem xmlns:ds="http://schemas.openxmlformats.org/officeDocument/2006/customXml" ds:itemID="{CC2FADE7-0FB7-4D32-803A-97A461853B0F}">
+<ds:datastoreItem xmlns:ds="http://schemas.openxmlformats.org/officeDocument/2006/customXml" ds:itemID="{FEDE263F-0510-4442-823E-69B63ECB61E1}">
   <ds:schemaRefs>
-    <ds:schemaRef ds:uri="http://schemas.microsoft.com/office/2006/metadata/contentType"/>
-    <ds:schemaRef ds:uri="http://schemas.microsoft.com/office/2006/metadata/properties/metaAttributes"/>
-    <ds:schemaRef ds:uri="http://www.w3.org/2001/XMLSchema"/>
-    <ds:schemaRef ds:uri="http://schemas.microsoft.com/office/2006/metadata/properties"/>
-    <ds:schemaRef ds:uri="475f1e55-3009-46d8-9566-5d569a2b3a98"/>
-    <ds:schemaRef ds:uri="http://schemas.microsoft.com/office/2006/documentManagement/types"/>
-    <ds:schemaRef ds:uri="http://schemas.microsoft.com/office/infopath/2007/PartnerControls"/>
-    <ds:schemaRef ds:uri="http://schemas.openxmlformats.org/package/2006/metadata/core-properties"/>
-    <ds:schemaRef ds:uri="http://purl.org/dc/elements/1.1/"/>
-    <ds:schemaRef ds:uri="http://purl.org/dc/terms/"/>
-    <ds:schemaRef ds:uri="http://schemas.microsoft.com/internal/obd"/>
+    <ds:schemaRef ds:uri="http://schemas.microsoft.com/sharepoint/v3/contenttype/forms"/>
   </ds:schemaRefs>
 </ds:datastoreItem>
 </file>
</xml_diff>

<commit_message>
Updating the content of document
Update the course handout PPT.

Signed-off-by: manjucc <106427133@qq.com>
</commit_message>
<xml_diff>
--- a/lfs-7.7-systemd/documents/LFS-on-openEuler_Course-Handout_v1.3.pptx
+++ b/lfs-7.7-systemd/documents/LFS-on-openEuler_Course-Handout_v1.3.pptx
@@ -8,10 +8,10 @@
     <p:sldMasterId id="2147483891" r:id="rId7"/>
   </p:sldMasterIdLst>
   <p:notesMasterIdLst>
-    <p:notesMasterId r:id="rId42"/>
+    <p:notesMasterId r:id="rId43"/>
   </p:notesMasterIdLst>
   <p:handoutMasterIdLst>
-    <p:handoutMasterId r:id="rId43"/>
+    <p:handoutMasterId r:id="rId44"/>
   </p:handoutMasterIdLst>
   <p:sldIdLst>
     <p:sldId id="257" r:id="rId8"/>
@@ -41,13 +41,14 @@
     <p:sldId id="278" r:id="rId32"/>
     <p:sldId id="279" r:id="rId33"/>
     <p:sldId id="321" r:id="rId34"/>
-    <p:sldId id="297" r:id="rId35"/>
-    <p:sldId id="294" r:id="rId36"/>
-    <p:sldId id="265" r:id="rId37"/>
-    <p:sldId id="268" r:id="rId38"/>
-    <p:sldId id="269" r:id="rId39"/>
-    <p:sldId id="295" r:id="rId40"/>
-    <p:sldId id="296" r:id="rId41"/>
+    <p:sldId id="325" r:id="rId35"/>
+    <p:sldId id="297" r:id="rId36"/>
+    <p:sldId id="294" r:id="rId37"/>
+    <p:sldId id="265" r:id="rId38"/>
+    <p:sldId id="268" r:id="rId39"/>
+    <p:sldId id="269" r:id="rId40"/>
+    <p:sldId id="295" r:id="rId41"/>
+    <p:sldId id="296" r:id="rId42"/>
   </p:sldIdLst>
   <p:sldSz cx="12192000" cy="6858000"/>
   <p:notesSz cx="7010400" cy="9296400"/>
@@ -266,7 +267,7 @@
               <a:rPr lang="en-US" smtClean="0">
                 <a:latin typeface="Huawei Sans" panose="020C0503030203020204" pitchFamily="34" charset="0"/>
               </a:rPr>
-              <a:t>1/12/2022</a:t>
+              <a:t>1/13/2022</a:t>
             </a:fld>
             <a:endParaRPr lang="en-US" dirty="0">
               <a:latin typeface="Huawei Sans" panose="020C0503030203020204" pitchFamily="34" charset="0"/>
@@ -28758,7 +28759,7 @@
           <a:p>
             <a:r>
               <a:rPr lang="zh-CN" altLang="en-US" dirty="0"/>
-              <a:t>这又是一个很好的锻炼机会，学过 </a:t>
+              <a:t>这不啻为又一个很好的锻炼机会，学过 </a:t>
             </a:r>
             <a:r>
               <a:rPr lang="en-US" altLang="zh-CN" dirty="0"/>
@@ -28781,15 +28782,7 @@
             </a:r>
             <a:r>
               <a:rPr lang="zh-CN" altLang="en-US" dirty="0"/>
-              <a:t>目标系统</a:t>
-            </a:r>
-            <a:r>
-              <a:rPr lang="zh-CN" altLang="en-US"/>
-              <a:t>构建的流程，</a:t>
-            </a:r>
-            <a:r>
-              <a:rPr lang="zh-CN" altLang="en-US" dirty="0"/>
-              <a:t>本实验没有给出修正方案，而是留给有兴趣的同学自己去解决。</a:t>
+              <a:t>目标系统构建的流程，本实验没有给出修正方案，而是留给有兴趣的同学自己去解决。</a:t>
             </a:r>
             <a:endParaRPr lang="en-US" altLang="zh-CN" dirty="0"/>
           </a:p>
@@ -28851,7 +28844,7 @@
           <a:p>
             <a:r>
               <a:rPr lang="zh-CN" altLang="en-US" dirty="0"/>
-              <a:t>进阶任务</a:t>
+              <a:t>如何提交作业</a:t>
             </a:r>
             <a:endParaRPr lang="en-US" dirty="0"/>
           </a:p>
@@ -28880,129 +28873,135 @@
           <a:p>
             <a:r>
               <a:rPr lang="zh-CN" altLang="en-US" dirty="0"/>
+              <a:t>本实验以开源社区项目开发的方式提交作业，遵循以下流程：</a:t>
+            </a:r>
+            <a:endParaRPr lang="en-US" altLang="zh-CN" dirty="0"/>
+          </a:p>
+          <a:p>
+            <a:pPr lvl="1"/>
+            <a:r>
+              <a:rPr lang="zh-TW" altLang="en-US" dirty="0"/>
               <a:t>在 </a:t>
             </a:r>
             <a:r>
-              <a:rPr lang="en-US" altLang="zh-CN" dirty="0" err="1"/>
-              <a:t>openEuler</a:t>
+              <a:rPr lang="en-US" dirty="0" err="1"/>
+              <a:t>Gitee</a:t>
+            </a:r>
+            <a:r>
+              <a:rPr lang="en-US" dirty="0"/>
+              <a:t> </a:t>
+            </a:r>
+            <a:r>
+              <a:rPr lang="zh-TW" altLang="en-US" dirty="0"/>
+              <a:t>平台（</a:t>
+            </a:r>
+            <a:r>
+              <a:rPr lang="en-US" dirty="0"/>
+              <a:t>https://gitee.com/）</a:t>
+            </a:r>
+            <a:r>
+              <a:rPr lang="zh-TW" altLang="en-US" dirty="0"/>
+              <a:t>上注册账号</a:t>
+            </a:r>
+            <a:r>
+              <a:rPr lang="zh-CN" altLang="en-US" dirty="0"/>
+              <a:t>；</a:t>
+            </a:r>
+            <a:endParaRPr lang="en-US" altLang="zh-TW" dirty="0"/>
+          </a:p>
+          <a:p>
+            <a:pPr lvl="1"/>
+            <a:r>
+              <a:rPr lang="zh-TW" altLang="en-US" dirty="0"/>
+              <a:t>签署个人 </a:t>
+            </a:r>
+            <a:r>
+              <a:rPr lang="en-US" dirty="0"/>
+              <a:t>CLA</a:t>
+            </a:r>
+            <a:r>
+              <a:rPr lang="zh-CN" altLang="en-US" dirty="0"/>
+              <a:t>；</a:t>
+            </a:r>
+            <a:endParaRPr lang="en-US" dirty="0"/>
+          </a:p>
+          <a:p>
+            <a:pPr lvl="1"/>
+            <a:r>
+              <a:rPr lang="zh-TW" altLang="en-US" dirty="0"/>
+              <a:t>将您要提交 </a:t>
+            </a:r>
+            <a:r>
+              <a:rPr lang="en-US" dirty="0"/>
+              <a:t>PR</a:t>
+            </a:r>
+            <a:r>
+              <a:rPr lang="zh-CN" altLang="en-US" dirty="0"/>
+              <a:t>（</a:t>
             </a:r>
             <a:r>
               <a:rPr lang="en-US" altLang="zh-CN" dirty="0"/>
+              <a:t>Pull Request</a:t>
+            </a:r>
+            <a:r>
+              <a:rPr lang="zh-CN" altLang="en-US" dirty="0"/>
+              <a:t>）</a:t>
+            </a:r>
+            <a:r>
+              <a:rPr lang="en-US" dirty="0"/>
               <a:t> </a:t>
             </a:r>
             <a:r>
-              <a:rPr lang="zh-CN" altLang="en-US" dirty="0"/>
-              <a:t>开发环境，将刚构建出的 </a:t>
+              <a:rPr lang="zh-TW" altLang="en-US" dirty="0"/>
+              <a:t>作业的上游仓库 </a:t>
+            </a:r>
+            <a:r>
+              <a:rPr lang="en-US" dirty="0"/>
+              <a:t>fork </a:t>
+            </a:r>
+            <a:r>
+              <a:rPr lang="zh-TW" altLang="en-US" dirty="0"/>
+              <a:t>到您自己的 </a:t>
+            </a:r>
+            <a:r>
+              <a:rPr lang="en-US" dirty="0" err="1"/>
+              <a:t>gitee</a:t>
+            </a:r>
+            <a:r>
+              <a:rPr lang="en-US" dirty="0"/>
+              <a:t> </a:t>
+            </a:r>
+            <a:r>
+              <a:rPr lang="zh-TW" altLang="en-US" dirty="0"/>
+              <a:t>账号下</a:t>
+            </a:r>
+            <a:r>
+              <a:rPr lang="zh-CN" altLang="en-US" dirty="0"/>
+              <a:t>；</a:t>
+            </a:r>
+            <a:endParaRPr lang="en-US" altLang="zh-TW" dirty="0"/>
+          </a:p>
+          <a:p>
+            <a:pPr lvl="1"/>
+            <a:r>
+              <a:rPr lang="zh-CN" altLang="en-US" dirty="0"/>
+              <a:t>以新的分支在自己仓库中进行修改；</a:t>
+            </a:r>
+            <a:endParaRPr lang="en-US" altLang="zh-CN" dirty="0"/>
+          </a:p>
+          <a:p>
+            <a:pPr lvl="1"/>
+            <a:r>
+              <a:rPr lang="zh-CN" altLang="en-US" dirty="0"/>
+              <a:t>修改完成后向上游仓库提交 </a:t>
             </a:r>
             <a:r>
               <a:rPr lang="en-US" altLang="zh-CN" dirty="0"/>
-              <a:t>LFS </a:t>
-            </a:r>
-            <a:r>
-              <a:rPr lang="zh-CN" altLang="en-US" dirty="0"/>
-              <a:t>镜像作为虚拟机镜像，使用 </a:t>
-            </a:r>
-            <a:r>
-              <a:rPr lang="en-US" altLang="zh-CN" dirty="0"/>
-              <a:t>QEMU </a:t>
-            </a:r>
-            <a:r>
-              <a:rPr lang="zh-CN" altLang="en-US" dirty="0"/>
-              <a:t>启动一个 </a:t>
-            </a:r>
-            <a:r>
-              <a:rPr lang="en-US" altLang="zh-CN" dirty="0"/>
-              <a:t>LFS </a:t>
-            </a:r>
-            <a:r>
-              <a:rPr lang="zh-CN" altLang="en-US" dirty="0"/>
-              <a:t>目标系统虚拟机。</a:t>
-            </a:r>
-          </a:p>
-          <a:p>
-            <a:r>
-              <a:rPr lang="zh-CN" altLang="en-US" dirty="0"/>
-              <a:t>使用 </a:t>
-            </a:r>
-            <a:r>
-              <a:rPr lang="en-US" altLang="zh-CN" dirty="0" err="1"/>
-              <a:t>StratoVirt</a:t>
-            </a:r>
-            <a:r>
-              <a:rPr lang="en-US" altLang="zh-CN" dirty="0"/>
-              <a:t> </a:t>
-            </a:r>
-            <a:r>
-              <a:rPr lang="zh-CN" altLang="en-US" dirty="0"/>
-              <a:t>替代 </a:t>
-            </a:r>
-            <a:r>
-              <a:rPr lang="en-US" altLang="zh-CN" dirty="0"/>
-              <a:t>QEMU </a:t>
-            </a:r>
-            <a:r>
-              <a:rPr lang="zh-CN" altLang="en-US" dirty="0"/>
-              <a:t>启动 </a:t>
-            </a:r>
-            <a:r>
-              <a:rPr lang="en-US" altLang="zh-CN" dirty="0"/>
-              <a:t>LFS </a:t>
-            </a:r>
-            <a:r>
-              <a:rPr lang="zh-CN" altLang="en-US" dirty="0"/>
-              <a:t>目标系统虚拟机。</a:t>
-            </a:r>
-          </a:p>
-          <a:p>
-            <a:r>
-              <a:rPr lang="zh-CN" altLang="en-US" dirty="0"/>
-              <a:t>基于 </a:t>
-            </a:r>
-            <a:r>
-              <a:rPr lang="en-US" altLang="zh-CN" dirty="0"/>
-              <a:t>openEuler-21.03 </a:t>
-            </a:r>
-            <a:r>
-              <a:rPr lang="zh-CN" altLang="en-US" dirty="0"/>
-              <a:t>所用的 </a:t>
-            </a:r>
-            <a:r>
-              <a:rPr lang="en-US" altLang="zh-CN" dirty="0"/>
-              <a:t>5.10 </a:t>
-            </a:r>
-            <a:r>
-              <a:rPr lang="zh-CN" altLang="en-US" dirty="0"/>
-              <a:t>内核构建 </a:t>
-            </a:r>
-            <a:r>
-              <a:rPr lang="en-US" altLang="zh-CN" dirty="0"/>
-              <a:t>LFS </a:t>
-            </a:r>
-            <a:r>
-              <a:rPr lang="zh-CN" altLang="en-US" dirty="0"/>
-              <a:t>目标系统。</a:t>
-            </a:r>
-          </a:p>
-          <a:p>
-            <a:r>
-              <a:rPr lang="zh-CN" altLang="en-US" dirty="0"/>
-              <a:t>基于鲲鹏处理器 </a:t>
-            </a:r>
-            <a:r>
-              <a:rPr lang="en-US" altLang="zh-CN" dirty="0"/>
-              <a:t>aarch64 </a:t>
-            </a:r>
-            <a:r>
-              <a:rPr lang="zh-CN" altLang="en-US" dirty="0"/>
-              <a:t>架构构建 </a:t>
-            </a:r>
-            <a:r>
-              <a:rPr lang="en-US" altLang="zh-CN" dirty="0"/>
-              <a:t>LFS </a:t>
-            </a:r>
-            <a:r>
-              <a:rPr lang="zh-CN" altLang="en-US" dirty="0"/>
-              <a:t>目标系统。</a:t>
+              <a:t>PR</a:t>
+            </a:r>
+            <a:r>
+              <a:rPr lang="zh-CN" altLang="en-US" dirty="0"/>
+              <a:t>。</a:t>
             </a:r>
             <a:endParaRPr lang="en-US" dirty="0"/>
           </a:p>
@@ -29011,7 +29010,7 @@
     </p:spTree>
     <p:extLst>
       <p:ext uri="{BB962C8B-B14F-4D97-AF65-F5344CB8AC3E}">
-        <p14:creationId xmlns:p14="http://schemas.microsoft.com/office/powerpoint/2010/main" val="3588435902"/>
+        <p14:creationId xmlns:p14="http://schemas.microsoft.com/office/powerpoint/2010/main" val="767392860"/>
       </p:ext>
     </p:extLst>
   </p:cSld>
@@ -29040,10 +29039,10 @@
       </p:grpSpPr>
       <p:sp>
         <p:nvSpPr>
-          <p:cNvPr id="3" name="Content Placeholder 2">
+          <p:cNvPr id="2" name="Title 1">
             <a:extLst>
               <a:ext uri="{FF2B5EF4-FFF2-40B4-BE49-F238E27FC236}">
-                <a16:creationId xmlns:a16="http://schemas.microsoft.com/office/drawing/2014/main" id="{97352B85-C59C-41AB-BA99-341EF24C34AC}"/>
+                <a16:creationId xmlns:a16="http://schemas.microsoft.com/office/drawing/2014/main" id="{BC9AD3AA-AA82-41E3-8C31-01DF302056CA}"/>
               </a:ext>
             </a:extLst>
           </p:cNvPr>
@@ -29051,7 +29050,7 @@
             <a:spLocks noGrp="1"/>
           </p:cNvSpPr>
           <p:nvPr>
-            <p:ph sz="quarter" idx="10"/>
+            <p:ph type="title"/>
           </p:nvPr>
         </p:nvSpPr>
         <p:spPr/>
@@ -29061,7 +29060,36 @@
           <a:p>
             <a:r>
               <a:rPr lang="zh-CN" altLang="en-US" dirty="0"/>
-              <a:t>本章介绍了 </a:t>
+              <a:t>进阶任务</a:t>
+            </a:r>
+            <a:endParaRPr lang="en-US" dirty="0"/>
+          </a:p>
+        </p:txBody>
+      </p:sp>
+      <p:sp>
+        <p:nvSpPr>
+          <p:cNvPr id="3" name="Text Placeholder 2">
+            <a:extLst>
+              <a:ext uri="{FF2B5EF4-FFF2-40B4-BE49-F238E27FC236}">
+                <a16:creationId xmlns:a16="http://schemas.microsoft.com/office/drawing/2014/main" id="{7F33FED0-70BC-4546-BB86-59A28B14B3FA}"/>
+              </a:ext>
+            </a:extLst>
+          </p:cNvPr>
+          <p:cNvSpPr>
+            <a:spLocks noGrp="1"/>
+          </p:cNvSpPr>
+          <p:nvPr>
+            <p:ph type="body" sz="quarter" idx="10"/>
+          </p:nvPr>
+        </p:nvSpPr>
+        <p:spPr/>
+        <p:txBody>
+          <a:bodyPr/>
+          <a:lstStyle/>
+          <a:p>
+            <a:r>
+              <a:rPr lang="zh-CN" altLang="en-US" dirty="0"/>
+              <a:t>在 </a:t>
             </a:r>
             <a:r>
               <a:rPr lang="en-US" altLang="zh-CN" dirty="0" err="1"/>
@@ -29073,7 +29101,7 @@
             </a:r>
             <a:r>
               <a:rPr lang="zh-CN" altLang="en-US" dirty="0"/>
-              <a:t>开源创新实践课 </a:t>
+              <a:t>开发环境，将刚构建出的 </a:t>
             </a:r>
             <a:r>
               <a:rPr lang="en-US" altLang="zh-CN" dirty="0"/>
@@ -29081,23 +29109,15 @@
             </a:r>
             <a:r>
               <a:rPr lang="zh-CN" altLang="en-US" dirty="0"/>
-              <a:t>的原理、流程以及关要，以帮助学员顺利地从 </a:t>
+              <a:t>镜像作为虚拟机镜像，使用 </a:t>
             </a:r>
             <a:r>
               <a:rPr lang="en-US" altLang="zh-CN" dirty="0"/>
-              <a:t>0 </a:t>
-            </a:r>
-            <a:r>
-              <a:rPr lang="zh-CN" altLang="en-US" dirty="0"/>
-              <a:t>到 </a:t>
-            </a:r>
-            <a:r>
-              <a:rPr lang="en-US" altLang="zh-CN" dirty="0"/>
-              <a:t>1 </a:t>
-            </a:r>
-            <a:r>
-              <a:rPr lang="zh-CN" altLang="en-US" dirty="0"/>
-              <a:t>构建自己的 </a:t>
+              <a:t>QEMU </a:t>
+            </a:r>
+            <a:r>
+              <a:rPr lang="zh-CN" altLang="en-US" dirty="0"/>
+              <a:t>启动一个 </a:t>
             </a:r>
             <a:r>
               <a:rPr lang="en-US" altLang="zh-CN" dirty="0"/>
@@ -29105,7 +29125,93 @@
             </a:r>
             <a:r>
               <a:rPr lang="zh-CN" altLang="en-US" dirty="0"/>
-              <a:t>目标系统。通过本章的学习，学员也应该能够达到这个目标。</a:t>
+              <a:t>目标系统虚拟机。</a:t>
+            </a:r>
+          </a:p>
+          <a:p>
+            <a:r>
+              <a:rPr lang="zh-CN" altLang="en-US" dirty="0"/>
+              <a:t>使用 </a:t>
+            </a:r>
+            <a:r>
+              <a:rPr lang="en-US" altLang="zh-CN" dirty="0" err="1"/>
+              <a:t>StratoVirt</a:t>
+            </a:r>
+            <a:r>
+              <a:rPr lang="en-US" altLang="zh-CN" dirty="0"/>
+              <a:t> </a:t>
+            </a:r>
+            <a:r>
+              <a:rPr lang="zh-CN" altLang="en-US" dirty="0"/>
+              <a:t>替代 </a:t>
+            </a:r>
+            <a:r>
+              <a:rPr lang="en-US" altLang="zh-CN" dirty="0"/>
+              <a:t>QEMU </a:t>
+            </a:r>
+            <a:r>
+              <a:rPr lang="zh-CN" altLang="en-US" dirty="0"/>
+              <a:t>启动 </a:t>
+            </a:r>
+            <a:r>
+              <a:rPr lang="en-US" altLang="zh-CN" dirty="0"/>
+              <a:t>LFS </a:t>
+            </a:r>
+            <a:r>
+              <a:rPr lang="zh-CN" altLang="en-US" dirty="0"/>
+              <a:t>目标系统虚拟机。</a:t>
+            </a:r>
+          </a:p>
+          <a:p>
+            <a:r>
+              <a:rPr lang="zh-CN" altLang="en-US" dirty="0"/>
+              <a:t>基于 </a:t>
+            </a:r>
+            <a:r>
+              <a:rPr lang="en-US" altLang="zh-CN" dirty="0"/>
+              <a:t>openEuler-21.03 </a:t>
+            </a:r>
+            <a:r>
+              <a:rPr lang="zh-CN" altLang="en-US" dirty="0"/>
+              <a:t>所用的 </a:t>
+            </a:r>
+            <a:r>
+              <a:rPr lang="en-US" altLang="zh-CN" dirty="0"/>
+              <a:t>5.10 </a:t>
+            </a:r>
+            <a:r>
+              <a:rPr lang="zh-CN" altLang="en-US" dirty="0"/>
+              <a:t>内核构建 </a:t>
+            </a:r>
+            <a:r>
+              <a:rPr lang="en-US" altLang="zh-CN" dirty="0"/>
+              <a:t>LFS </a:t>
+            </a:r>
+            <a:r>
+              <a:rPr lang="zh-CN" altLang="en-US" dirty="0"/>
+              <a:t>目标系统。</a:t>
+            </a:r>
+          </a:p>
+          <a:p>
+            <a:r>
+              <a:rPr lang="zh-CN" altLang="en-US" dirty="0"/>
+              <a:t>基于鲲鹏处理器 </a:t>
+            </a:r>
+            <a:r>
+              <a:rPr lang="en-US" altLang="zh-CN" dirty="0"/>
+              <a:t>aarch64 </a:t>
+            </a:r>
+            <a:r>
+              <a:rPr lang="zh-CN" altLang="en-US" dirty="0"/>
+              <a:t>架构构建 </a:t>
+            </a:r>
+            <a:r>
+              <a:rPr lang="en-US" altLang="zh-CN" dirty="0"/>
+              <a:t>LFS </a:t>
+            </a:r>
+            <a:r>
+              <a:rPr lang="zh-CN" altLang="en-US" dirty="0"/>
+              <a:t>目标系统。</a:t>
             </a:r>
             <a:endParaRPr lang="en-US" dirty="0"/>
           </a:p>
@@ -29114,7 +29220,7 @@
     </p:spTree>
     <p:extLst>
       <p:ext uri="{BB962C8B-B14F-4D97-AF65-F5344CB8AC3E}">
-        <p14:creationId xmlns:p14="http://schemas.microsoft.com/office/powerpoint/2010/main" val="3466996417"/>
+        <p14:creationId xmlns:p14="http://schemas.microsoft.com/office/powerpoint/2010/main" val="3588435902"/>
       </p:ext>
     </p:extLst>
   </p:cSld>
@@ -29211,12 +29317,18 @@
       </p:grpSpPr>
       <p:sp>
         <p:nvSpPr>
-          <p:cNvPr id="2" name="文本占位符 1"/>
+          <p:cNvPr id="3" name="Content Placeholder 2">
+            <a:extLst>
+              <a:ext uri="{FF2B5EF4-FFF2-40B4-BE49-F238E27FC236}">
+                <a16:creationId xmlns:a16="http://schemas.microsoft.com/office/drawing/2014/main" id="{97352B85-C59C-41AB-BA99-341EF24C34AC}"/>
+              </a:ext>
+            </a:extLst>
+          </p:cNvPr>
           <p:cNvSpPr>
             <a:spLocks noGrp="1"/>
           </p:cNvSpPr>
           <p:nvPr>
-            <p:ph type="body" sz="quarter" idx="10"/>
+            <p:ph sz="quarter" idx="10"/>
           </p:nvPr>
         </p:nvSpPr>
         <p:spPr/>
@@ -29226,29 +29338,60 @@
           <a:p>
             <a:r>
               <a:rPr lang="zh-CN" altLang="en-US" dirty="0"/>
-              <a:t>如何让构建速度更快？</a:t>
-            </a:r>
-            <a:endParaRPr lang="en-US" altLang="zh-CN" dirty="0"/>
-          </a:p>
-          <a:p>
-            <a:r>
-              <a:rPr lang="zh-CN" altLang="en-US" dirty="0"/>
-              <a:t>如何配置新系统的网络？</a:t>
-            </a:r>
-            <a:endParaRPr lang="en-US" altLang="zh-CN" dirty="0"/>
-          </a:p>
-          <a:p>
-            <a:r>
-              <a:rPr lang="zh-CN" altLang="en-US"/>
-              <a:t>如何将新系统分享给他人？</a:t>
-            </a:r>
+              <a:t>本章介绍了 </a:t>
+            </a:r>
+            <a:r>
+              <a:rPr lang="en-US" altLang="zh-CN" dirty="0" err="1"/>
+              <a:t>openEuler</a:t>
+            </a:r>
+            <a:r>
+              <a:rPr lang="en-US" altLang="zh-CN" dirty="0"/>
+              <a:t> </a:t>
+            </a:r>
+            <a:r>
+              <a:rPr lang="zh-CN" altLang="en-US" dirty="0"/>
+              <a:t>开源创新实践课 </a:t>
+            </a:r>
+            <a:r>
+              <a:rPr lang="en-US" altLang="zh-CN" dirty="0"/>
+              <a:t>LFS </a:t>
+            </a:r>
+            <a:r>
+              <a:rPr lang="zh-CN" altLang="en-US" dirty="0"/>
+              <a:t>的原理、流程以及关要，以帮助学员顺利地从 </a:t>
+            </a:r>
+            <a:r>
+              <a:rPr lang="en-US" altLang="zh-CN" dirty="0"/>
+              <a:t>0 </a:t>
+            </a:r>
+            <a:r>
+              <a:rPr lang="zh-CN" altLang="en-US" dirty="0"/>
+              <a:t>到 </a:t>
+            </a:r>
+            <a:r>
+              <a:rPr lang="en-US" altLang="zh-CN" dirty="0"/>
+              <a:t>1 </a:t>
+            </a:r>
+            <a:r>
+              <a:rPr lang="zh-CN" altLang="en-US" dirty="0"/>
+              <a:t>构建自己的 </a:t>
+            </a:r>
+            <a:r>
+              <a:rPr lang="en-US" altLang="zh-CN" dirty="0"/>
+              <a:t>LFS </a:t>
+            </a:r>
+            <a:r>
+              <a:rPr lang="zh-CN" altLang="en-US" dirty="0"/>
+              <a:t>目标系统。通过本章的学习，学员也应该能够达到这个目标。</a:t>
+            </a:r>
+            <a:endParaRPr lang="en-US" dirty="0"/>
           </a:p>
         </p:txBody>
       </p:sp>
     </p:spTree>
     <p:extLst>
       <p:ext uri="{BB962C8B-B14F-4D97-AF65-F5344CB8AC3E}">
-        <p14:creationId xmlns:p14="http://schemas.microsoft.com/office/powerpoint/2010/main" val="530091429"/>
+        <p14:creationId xmlns:p14="http://schemas.microsoft.com/office/powerpoint/2010/main" val="3466996417"/>
       </p:ext>
     </p:extLst>
   </p:cSld>
@@ -29277,7 +29420,7 @@
       </p:grpSpPr>
       <p:sp>
         <p:nvSpPr>
-          <p:cNvPr id="3" name="文本占位符 2"/>
+          <p:cNvPr id="2" name="文本占位符 1"/>
           <p:cNvSpPr>
             <a:spLocks noGrp="1"/>
           </p:cNvSpPr>
@@ -29285,122 +29428,36 @@
             <p:ph type="body" sz="quarter" idx="10"/>
           </p:nvPr>
         </p:nvSpPr>
-        <p:spPr>
-          <a:xfrm>
-            <a:off x="1019175" y="1844675"/>
-            <a:ext cx="10153650" cy="4356100"/>
-          </a:xfrm>
-        </p:spPr>
+        <p:spPr/>
         <p:txBody>
           <a:bodyPr/>
           <a:lstStyle/>
           <a:p>
             <a:r>
-              <a:rPr lang="en-US" altLang="zh-CN" dirty="0" err="1"/>
-              <a:t>openEuler</a:t>
-            </a:r>
-            <a:r>
-              <a:rPr lang="en-US" altLang="zh-CN" dirty="0"/>
-              <a:t> </a:t>
-            </a:r>
-            <a:r>
-              <a:rPr lang="zh-CN" altLang="en-US" dirty="0"/>
-              <a:t>官网：</a:t>
-            </a:r>
-            <a:r>
-              <a:rPr lang="en-US" altLang="zh-CN" dirty="0">
-                <a:hlinkClick r:id="rId3"/>
-              </a:rPr>
-              <a:t>https://openeuler.org/</a:t>
+              <a:rPr lang="zh-CN" altLang="en-US" dirty="0"/>
+              <a:t>如何让构建速度更快？</a:t>
             </a:r>
             <a:endParaRPr lang="en-US" altLang="zh-CN" dirty="0"/>
           </a:p>
           <a:p>
             <a:r>
-              <a:rPr lang="zh-TW" altLang="en-US" dirty="0"/>
-              <a:t>项目托管地：</a:t>
-            </a:r>
-            <a:r>
-              <a:rPr lang="en-US" altLang="zh-CN" dirty="0">
-                <a:hlinkClick r:id="rId4"/>
-              </a:rPr>
-              <a:t>https://gitee.com/openeuler-practice-courses/lfs-course</a:t>
-            </a:r>
-            <a:r>
-              <a:rPr lang="en-US" altLang="zh-CN" dirty="0"/>
-              <a:t> </a:t>
-            </a:r>
-          </a:p>
-          <a:p>
-            <a:r>
-              <a:rPr lang="en-US" altLang="zh-CN" dirty="0"/>
-              <a:t>LFS </a:t>
-            </a:r>
-            <a:r>
-              <a:rPr lang="zh-CN" altLang="en-US" dirty="0"/>
-              <a:t>官网：</a:t>
-            </a:r>
-            <a:r>
-              <a:rPr lang="en-US" altLang="zh-CN" dirty="0"/>
-              <a:t> </a:t>
-            </a:r>
-            <a:r>
-              <a:rPr lang="en-US" altLang="zh-CN" dirty="0">
-                <a:hlinkClick r:id="rId5"/>
-              </a:rPr>
-              <a:t>https://www.linuxfromscratch.org/lfs/</a:t>
+              <a:rPr lang="zh-CN" altLang="en-US" dirty="0"/>
+              <a:t>如何配置新系统的网络？</a:t>
             </a:r>
             <a:endParaRPr lang="en-US" altLang="zh-CN" dirty="0"/>
           </a:p>
           <a:p>
             <a:r>
-              <a:rPr lang="zh-CN" altLang="en-US" dirty="0"/>
-              <a:t>鲲鹏生态官网：</a:t>
-            </a:r>
-            <a:r>
-              <a:rPr lang="en-US" altLang="zh-CN" dirty="0"/>
-              <a:t> </a:t>
-            </a:r>
-            <a:r>
-              <a:rPr lang="en-US" altLang="zh-CN" dirty="0">
-                <a:hlinkClick r:id="rId6"/>
-              </a:rPr>
-              <a:t>https://www.hikunpeng.com/zh/</a:t>
-            </a:r>
-            <a:endParaRPr lang="en-US" altLang="zh-CN" dirty="0"/>
-          </a:p>
-          <a:p>
-            <a:r>
-              <a:rPr lang="en-US" altLang="zh-CN" dirty="0" err="1"/>
-              <a:t>Gitee</a:t>
-            </a:r>
-            <a:r>
-              <a:rPr lang="zh-TW" altLang="en-US" dirty="0"/>
-              <a:t>工作流说明：</a:t>
-            </a:r>
-            <a:r>
-              <a:rPr lang="en-US" altLang="zh-CN" dirty="0">
-                <a:hlinkClick r:id="rId7"/>
-              </a:rPr>
-              <a:t>https://gitee.com/openeuler/community/blob/master/zh/contributors/Gitee-workflow.md</a:t>
-            </a:r>
-            <a:r>
-              <a:rPr lang="en-US" altLang="zh-CN" dirty="0"/>
-              <a:t> </a:t>
-            </a:r>
-          </a:p>
-          <a:p>
-            <a:endParaRPr lang="en-US" altLang="zh-CN" dirty="0"/>
-          </a:p>
-          <a:p>
-            <a:endParaRPr lang="zh-CN" altLang="en-US" dirty="0"/>
+              <a:rPr lang="zh-CN" altLang="en-US"/>
+              <a:t>如何将新系统分享给他人？</a:t>
+            </a:r>
           </a:p>
         </p:txBody>
       </p:sp>
     </p:spTree>
     <p:extLst>
       <p:ext uri="{BB962C8B-B14F-4D97-AF65-F5344CB8AC3E}">
-        <p14:creationId xmlns:p14="http://schemas.microsoft.com/office/powerpoint/2010/main" val="1724291223"/>
+        <p14:creationId xmlns:p14="http://schemas.microsoft.com/office/powerpoint/2010/main" val="530091429"/>
       </p:ext>
     </p:extLst>
   </p:cSld>
@@ -29437,6 +29494,158 @@
             <p:ph type="body" sz="quarter" idx="10"/>
           </p:nvPr>
         </p:nvSpPr>
+        <p:spPr>
+          <a:xfrm>
+            <a:off x="1019175" y="1844675"/>
+            <a:ext cx="10153650" cy="4356100"/>
+          </a:xfrm>
+        </p:spPr>
+        <p:txBody>
+          <a:bodyPr/>
+          <a:lstStyle/>
+          <a:p>
+            <a:r>
+              <a:rPr lang="en-US" altLang="zh-CN" dirty="0" err="1"/>
+              <a:t>openEuler</a:t>
+            </a:r>
+            <a:r>
+              <a:rPr lang="en-US" altLang="zh-CN" dirty="0"/>
+              <a:t> </a:t>
+            </a:r>
+            <a:r>
+              <a:rPr lang="zh-CN" altLang="en-US" dirty="0"/>
+              <a:t>官网：</a:t>
+            </a:r>
+            <a:r>
+              <a:rPr lang="en-US" altLang="zh-CN" dirty="0">
+                <a:hlinkClick r:id="rId3"/>
+              </a:rPr>
+              <a:t>https://openeuler.org/</a:t>
+            </a:r>
+            <a:endParaRPr lang="en-US" altLang="zh-CN" dirty="0"/>
+          </a:p>
+          <a:p>
+            <a:r>
+              <a:rPr lang="zh-TW" altLang="en-US" dirty="0"/>
+              <a:t>项目托管地：</a:t>
+            </a:r>
+            <a:r>
+              <a:rPr lang="en-US" altLang="zh-CN" dirty="0">
+                <a:hlinkClick r:id="rId4"/>
+              </a:rPr>
+              <a:t>https://gitee.com/openeuler-practice-courses/lfs-course</a:t>
+            </a:r>
+            <a:r>
+              <a:rPr lang="en-US" altLang="zh-CN" dirty="0"/>
+              <a:t> </a:t>
+            </a:r>
+          </a:p>
+          <a:p>
+            <a:r>
+              <a:rPr lang="en-US" altLang="zh-CN" dirty="0"/>
+              <a:t>LFS </a:t>
+            </a:r>
+            <a:r>
+              <a:rPr lang="zh-CN" altLang="en-US" dirty="0"/>
+              <a:t>官网：</a:t>
+            </a:r>
+            <a:r>
+              <a:rPr lang="en-US" altLang="zh-CN" dirty="0"/>
+              <a:t> </a:t>
+            </a:r>
+            <a:r>
+              <a:rPr lang="en-US" altLang="zh-CN" dirty="0">
+                <a:hlinkClick r:id="rId5"/>
+              </a:rPr>
+              <a:t>https://www.linuxfromscratch.org/lfs/</a:t>
+            </a:r>
+            <a:endParaRPr lang="en-US" altLang="zh-CN" dirty="0"/>
+          </a:p>
+          <a:p>
+            <a:r>
+              <a:rPr lang="zh-CN" altLang="en-US" dirty="0"/>
+              <a:t>鲲鹏生态官网：</a:t>
+            </a:r>
+            <a:r>
+              <a:rPr lang="en-US" altLang="zh-CN" dirty="0"/>
+              <a:t> </a:t>
+            </a:r>
+            <a:r>
+              <a:rPr lang="en-US" altLang="zh-CN" dirty="0">
+                <a:hlinkClick r:id="rId6"/>
+              </a:rPr>
+              <a:t>https://www.hikunpeng.com/zh/</a:t>
+            </a:r>
+            <a:endParaRPr lang="en-US" altLang="zh-CN" dirty="0"/>
+          </a:p>
+          <a:p>
+            <a:r>
+              <a:rPr lang="en-US" altLang="zh-CN" dirty="0" err="1"/>
+              <a:t>Gitee</a:t>
+            </a:r>
+            <a:r>
+              <a:rPr lang="zh-TW" altLang="en-US" dirty="0"/>
+              <a:t>工作流说明：</a:t>
+            </a:r>
+            <a:r>
+              <a:rPr lang="en-US" altLang="zh-CN" dirty="0">
+                <a:hlinkClick r:id="rId7"/>
+              </a:rPr>
+              <a:t>https://gitee.com/openeuler/community/blob/master/zh/contributors/Gitee-workflow.md</a:t>
+            </a:r>
+            <a:r>
+              <a:rPr lang="en-US" altLang="zh-CN" dirty="0"/>
+              <a:t> </a:t>
+            </a:r>
+          </a:p>
+          <a:p>
+            <a:endParaRPr lang="en-US" altLang="zh-CN" dirty="0"/>
+          </a:p>
+          <a:p>
+            <a:endParaRPr lang="zh-CN" altLang="en-US" dirty="0"/>
+          </a:p>
+        </p:txBody>
+      </p:sp>
+    </p:spTree>
+    <p:extLst>
+      <p:ext uri="{BB962C8B-B14F-4D97-AF65-F5344CB8AC3E}">
+        <p14:creationId xmlns:p14="http://schemas.microsoft.com/office/powerpoint/2010/main" val="1724291223"/>
+      </p:ext>
+    </p:extLst>
+  </p:cSld>
+  <p:clrMapOvr>
+    <a:masterClrMapping/>
+  </p:clrMapOvr>
+</p:sld>
+</file>
+
+<file path=ppt/slides/slide33.xml><?xml version="1.0" encoding="utf-8"?>
+<p:sld xmlns:a="http://schemas.openxmlformats.org/drawingml/2006/main" xmlns:r="http://schemas.openxmlformats.org/officeDocument/2006/relationships" xmlns:p="http://schemas.openxmlformats.org/presentationml/2006/main">
+  <p:cSld>
+    <p:spTree>
+      <p:nvGrpSpPr>
+        <p:cNvPr id="1" name=""/>
+        <p:cNvGrpSpPr/>
+        <p:nvPr/>
+      </p:nvGrpSpPr>
+      <p:grpSpPr>
+        <a:xfrm>
+          <a:off x="0" y="0"/>
+          <a:ext cx="0" cy="0"/>
+          <a:chOff x="0" y="0"/>
+          <a:chExt cx="0" cy="0"/>
+        </a:xfrm>
+      </p:grpSpPr>
+      <p:sp>
+        <p:nvSpPr>
+          <p:cNvPr id="3" name="文本占位符 2"/>
+          <p:cNvSpPr>
+            <a:spLocks noGrp="1"/>
+          </p:cNvSpPr>
+          <p:nvPr>
+            <p:ph type="body" sz="quarter" idx="10"/>
+          </p:nvPr>
+        </p:nvSpPr>
         <p:spPr/>
         <p:txBody>
           <a:bodyPr/>
@@ -29549,7 +29758,7 @@
 </p:sld>
 </file>
 
-<file path=ppt/slides/slide33.xml><?xml version="1.0" encoding="utf-8"?>
+<file path=ppt/slides/slide34.xml><?xml version="1.0" encoding="utf-8"?>
 <p:sld xmlns:a="http://schemas.openxmlformats.org/drawingml/2006/main" xmlns:r="http://schemas.openxmlformats.org/officeDocument/2006/relationships" xmlns:p="http://schemas.openxmlformats.org/presentationml/2006/main">
   <p:cSld>
     <p:spTree>
@@ -30236,7 +30445,7 @@
 </p:sld>
 </file>
 
-<file path=ppt/slides/slide34.xml><?xml version="1.0" encoding="utf-8"?>
+<file path=ppt/slides/slide35.xml><?xml version="1.0" encoding="utf-8"?>
 <p:sld xmlns:a="http://schemas.openxmlformats.org/drawingml/2006/main" xmlns:r="http://schemas.openxmlformats.org/officeDocument/2006/relationships" xmlns:p="http://schemas.openxmlformats.org/presentationml/2006/main">
   <p:cSld>
     <p:spTree>
@@ -33088,18 +33297,18 @@
 </file>
 
 <file path=customXml/item2.xml><?xml version="1.0" encoding="utf-8"?>
-<p:properties xmlns:p="http://schemas.microsoft.com/office/2006/metadata/properties" xmlns:xsi="http://www.w3.org/2001/XMLSchema-instance" xmlns:pc="http://schemas.microsoft.com/office/infopath/2007/PartnerControls">
-  <documentManagement/>
-</p:properties>
-</file>
-
-<file path=customXml/item3.xml><?xml version="1.0" encoding="utf-8"?>
 <?mso-contentType ?>
 <FormTemplates xmlns="http://schemas.microsoft.com/sharepoint/v3/contenttype/forms">
   <Display>DocumentLibraryForm</Display>
   <Edit>DocumentLibraryForm</Edit>
   <New>DocumentLibraryForm</New>
 </FormTemplates>
+</file>
+
+<file path=customXml/item3.xml><?xml version="1.0" encoding="utf-8"?>
+<p:properties xmlns:p="http://schemas.microsoft.com/office/2006/metadata/properties" xmlns:xsi="http://www.w3.org/2001/XMLSchema-instance" xmlns:pc="http://schemas.microsoft.com/office/infopath/2007/PartnerControls">
+  <documentManagement/>
+</p:properties>
 </file>
 
 <file path=customXml/itemProps1.xml><?xml version="1.0" encoding="utf-8"?>
@@ -33121,6 +33330,14 @@
 </file>
 
 <file path=customXml/itemProps2.xml><?xml version="1.0" encoding="utf-8"?>
+<ds:datastoreItem xmlns:ds="http://schemas.openxmlformats.org/officeDocument/2006/customXml" ds:itemID="{FEDE263F-0510-4442-823E-69B63ECB61E1}">
+  <ds:schemaRefs>
+    <ds:schemaRef ds:uri="http://schemas.microsoft.com/sharepoint/v3/contenttype/forms"/>
+  </ds:schemaRefs>
+</ds:datastoreItem>
+</file>
+
+<file path=customXml/itemProps3.xml><?xml version="1.0" encoding="utf-8"?>
 <ds:datastoreItem xmlns:ds="http://schemas.openxmlformats.org/officeDocument/2006/customXml" ds:itemID="{DA5960F2-6186-408B-A0DC-5CA5E58B604F}">
   <ds:schemaRefs>
     <ds:schemaRef ds:uri="http://www.w3.org/XML/1998/namespace"/>
@@ -33134,12 +33351,4 @@
     <ds:schemaRef ds:uri="http://purl.org/dc/terms/"/>
   </ds:schemaRefs>
 </ds:datastoreItem>
-</file>
-
-<file path=customXml/itemProps3.xml><?xml version="1.0" encoding="utf-8"?>
-<ds:datastoreItem xmlns:ds="http://schemas.openxmlformats.org/officeDocument/2006/customXml" ds:itemID="{FEDE263F-0510-4442-823E-69B63ECB61E1}">
-  <ds:schemaRefs>
-    <ds:schemaRef ds:uri="http://schemas.microsoft.com/sharepoint/v3/contenttype/forms"/>
-  </ds:schemaRefs>
-</ds:datastoreItem>
 </file>
</xml_diff>